<commit_message>
added theorems to paper
</commit_message>
<xml_diff>
--- a/cs534L-SAGmfP.pptx
+++ b/cs534L-SAGmfP.pptx
@@ -5,13 +5,14 @@
     <p:sldMasterId id="2147483660" r:id="rId1"/>
   </p:sldMasterIdLst>
   <p:notesMasterIdLst>
-    <p:notesMasterId r:id="rId6"/>
+    <p:notesMasterId r:id="rId7"/>
   </p:notesMasterIdLst>
   <p:sldIdLst>
     <p:sldId id="256" r:id="rId2"/>
     <p:sldId id="257" r:id="rId3"/>
     <p:sldId id="258" r:id="rId4"/>
-    <p:sldId id="259" r:id="rId5"/>
+    <p:sldId id="260" r:id="rId5"/>
+    <p:sldId id="259" r:id="rId6"/>
   </p:sldIdLst>
   <p:sldSz cx="9144000" cy="6858000" type="screen4x3"/>
   <p:notesSz cx="6858000" cy="9144000"/>
@@ -110,6 +111,11 @@
       </a:defRPr>
     </a:lvl9pPr>
   </p:defaultTextStyle>
+  <p:extLst>
+    <p:ext uri="{EFAFB233-063F-42B5-8137-9DF3F51BA10A}">
+      <p15:sldGuideLst xmlns:p15="http://schemas.microsoft.com/office/powerpoint/2012/main"/>
+    </p:ext>
+  </p:extLst>
 </p:presentation>
 </file>
 
@@ -195,7 +201,7 @@
           <a:p>
             <a:fld id="{4140C426-2EDB-40F5-B9CA-A52F95C4E26D}" type="datetimeFigureOut">
               <a:rPr lang="en-CA" smtClean="0"/>
-              <a:t>2014-12-16</a:t>
+              <a:t>2014-12-18</a:t>
             </a:fld>
             <a:endParaRPr lang="en-CA"/>
           </a:p>
@@ -678,7 +684,7 @@
           <a:p>
             <a:fld id="{15658FB7-9B39-48CD-B63A-9549C41BAA46}" type="datetimeFigureOut">
               <a:rPr lang="en-CA" smtClean="0"/>
-              <a:t>2014-12-16</a:t>
+              <a:t>2014-12-18</a:t>
             </a:fld>
             <a:endParaRPr lang="en-CA"/>
           </a:p>
@@ -848,7 +854,7 @@
           <a:p>
             <a:fld id="{15658FB7-9B39-48CD-B63A-9549C41BAA46}" type="datetimeFigureOut">
               <a:rPr lang="en-CA" smtClean="0"/>
-              <a:t>2014-12-16</a:t>
+              <a:t>2014-12-18</a:t>
             </a:fld>
             <a:endParaRPr lang="en-CA"/>
           </a:p>
@@ -1028,7 +1034,7 @@
           <a:p>
             <a:fld id="{15658FB7-9B39-48CD-B63A-9549C41BAA46}" type="datetimeFigureOut">
               <a:rPr lang="en-CA" smtClean="0"/>
-              <a:t>2014-12-16</a:t>
+              <a:t>2014-12-18</a:t>
             </a:fld>
             <a:endParaRPr lang="en-CA"/>
           </a:p>
@@ -1198,7 +1204,7 @@
           <a:p>
             <a:fld id="{15658FB7-9B39-48CD-B63A-9549C41BAA46}" type="datetimeFigureOut">
               <a:rPr lang="en-CA" smtClean="0"/>
-              <a:t>2014-12-16</a:t>
+              <a:t>2014-12-18</a:t>
             </a:fld>
             <a:endParaRPr lang="en-CA"/>
           </a:p>
@@ -1449,7 +1455,7 @@
           <a:p>
             <a:fld id="{15658FB7-9B39-48CD-B63A-9549C41BAA46}" type="datetimeFigureOut">
               <a:rPr lang="en-CA" smtClean="0"/>
-              <a:t>2014-12-16</a:t>
+              <a:t>2014-12-18</a:t>
             </a:fld>
             <a:endParaRPr lang="en-CA"/>
           </a:p>
@@ -1681,7 +1687,7 @@
           <a:p>
             <a:fld id="{15658FB7-9B39-48CD-B63A-9549C41BAA46}" type="datetimeFigureOut">
               <a:rPr lang="en-CA" smtClean="0"/>
-              <a:t>2014-12-16</a:t>
+              <a:t>2014-12-18</a:t>
             </a:fld>
             <a:endParaRPr lang="en-CA"/>
           </a:p>
@@ -2048,7 +2054,7 @@
           <a:p>
             <a:fld id="{15658FB7-9B39-48CD-B63A-9549C41BAA46}" type="datetimeFigureOut">
               <a:rPr lang="en-CA" smtClean="0"/>
-              <a:t>2014-12-16</a:t>
+              <a:t>2014-12-18</a:t>
             </a:fld>
             <a:endParaRPr lang="en-CA"/>
           </a:p>
@@ -2166,7 +2172,7 @@
           <a:p>
             <a:fld id="{15658FB7-9B39-48CD-B63A-9549C41BAA46}" type="datetimeFigureOut">
               <a:rPr lang="en-CA" smtClean="0"/>
-              <a:t>2014-12-16</a:t>
+              <a:t>2014-12-18</a:t>
             </a:fld>
             <a:endParaRPr lang="en-CA"/>
           </a:p>
@@ -2261,7 +2267,7 @@
           <a:p>
             <a:fld id="{15658FB7-9B39-48CD-B63A-9549C41BAA46}" type="datetimeFigureOut">
               <a:rPr lang="en-CA" smtClean="0"/>
-              <a:t>2014-12-16</a:t>
+              <a:t>2014-12-18</a:t>
             </a:fld>
             <a:endParaRPr lang="en-CA"/>
           </a:p>
@@ -2538,7 +2544,7 @@
           <a:p>
             <a:fld id="{15658FB7-9B39-48CD-B63A-9549C41BAA46}" type="datetimeFigureOut">
               <a:rPr lang="en-CA" smtClean="0"/>
-              <a:t>2014-12-16</a:t>
+              <a:t>2014-12-18</a:t>
             </a:fld>
             <a:endParaRPr lang="en-CA"/>
           </a:p>
@@ -2795,7 +2801,7 @@
           <a:p>
             <a:fld id="{15658FB7-9B39-48CD-B63A-9549C41BAA46}" type="datetimeFigureOut">
               <a:rPr lang="en-CA" smtClean="0"/>
-              <a:t>2014-12-16</a:t>
+              <a:t>2014-12-18</a:t>
             </a:fld>
             <a:endParaRPr lang="en-CA"/>
           </a:p>
@@ -3008,7 +3014,7 @@
           <a:p>
             <a:fld id="{15658FB7-9B39-48CD-B63A-9549C41BAA46}" type="datetimeFigureOut">
               <a:rPr lang="en-CA" smtClean="0"/>
-              <a:t>2014-12-16</a:t>
+              <a:t>2014-12-18</a:t>
             </a:fld>
             <a:endParaRPr lang="en-CA"/>
           </a:p>
@@ -3696,6 +3702,106 @@
 </file>
 
 <file path=ppt/slides/slide4.xml><?xml version="1.0" encoding="utf-8"?>
+<p:sld xmlns:a="http://schemas.openxmlformats.org/drawingml/2006/main" xmlns:r="http://schemas.openxmlformats.org/officeDocument/2006/relationships" xmlns:p="http://schemas.openxmlformats.org/presentationml/2006/main">
+  <p:cSld>
+    <p:spTree>
+      <p:nvGrpSpPr>
+        <p:cNvPr id="1" name=""/>
+        <p:cNvGrpSpPr/>
+        <p:nvPr/>
+      </p:nvGrpSpPr>
+      <p:grpSpPr>
+        <a:xfrm>
+          <a:off x="0" y="0"/>
+          <a:ext cx="0" cy="0"/>
+          <a:chOff x="0" y="0"/>
+          <a:chExt cx="0" cy="0"/>
+        </a:xfrm>
+      </p:grpSpPr>
+      <p:sp>
+        <p:nvSpPr>
+          <p:cNvPr id="2" name="Title 1"/>
+          <p:cNvSpPr>
+            <a:spLocks noGrp="1"/>
+          </p:cNvSpPr>
+          <p:nvPr>
+            <p:ph type="title"/>
+          </p:nvPr>
+        </p:nvSpPr>
+        <p:spPr/>
+        <p:txBody>
+          <a:bodyPr/>
+          <a:lstStyle/>
+          <a:p>
+            <a:endParaRPr lang="en-CA"/>
+          </a:p>
+        </p:txBody>
+      </p:sp>
+      <p:sp>
+        <p:nvSpPr>
+          <p:cNvPr id="3" name="Content Placeholder 2"/>
+          <p:cNvSpPr>
+            <a:spLocks noGrp="1"/>
+          </p:cNvSpPr>
+          <p:nvPr>
+            <p:ph idx="1"/>
+          </p:nvPr>
+        </p:nvSpPr>
+        <p:spPr/>
+        <p:txBody>
+          <a:bodyPr/>
+          <a:lstStyle/>
+          <a:p>
+            <a:r>
+              <a:rPr lang="en-CA" dirty="0" smtClean="0"/>
+              <a:t>Theorem 1: SAG-re has convergence rate at least as fast as the original SAG.</a:t>
+            </a:r>
+          </a:p>
+          <a:p>
+            <a:r>
+              <a:rPr lang="en-CA" dirty="0" smtClean="0"/>
+              <a:t>Theorem 2: Despite re-computation, SAG-re </a:t>
+            </a:r>
+            <a:r>
+              <a:rPr lang="en-CA" dirty="0"/>
+              <a:t>has asymptotic time complexity </a:t>
+            </a:r>
+            <a:r>
+              <a:rPr lang="en-CA" dirty="0" smtClean="0"/>
+              <a:t>as </a:t>
+            </a:r>
+            <a:r>
+              <a:rPr lang="en-CA" dirty="0"/>
+              <a:t>efficient </a:t>
+            </a:r>
+            <a:r>
+              <a:rPr lang="en-CA" dirty="0" smtClean="0"/>
+              <a:t>as any gradient method having the lowest iteration cost, namely stochastic gradient.</a:t>
+            </a:r>
+          </a:p>
+          <a:p>
+            <a:r>
+              <a:rPr lang="en-CA" dirty="0" smtClean="0"/>
+              <a:t>Theorem 3: Despite storing the memory gradients, SAG-re has asymptotic space complexity as compact as memory-less gradient methods.</a:t>
+            </a:r>
+            <a:endParaRPr lang="en-CA" dirty="0"/>
+          </a:p>
+        </p:txBody>
+      </p:sp>
+    </p:spTree>
+    <p:extLst>
+      <p:ext uri="{BB962C8B-B14F-4D97-AF65-F5344CB8AC3E}">
+        <p14:creationId xmlns:p14="http://schemas.microsoft.com/office/powerpoint/2010/main" val="4075649693"/>
+      </p:ext>
+    </p:extLst>
+  </p:cSld>
+  <p:clrMapOvr>
+    <a:masterClrMapping/>
+  </p:clrMapOvr>
+</p:sld>
+</file>
+
+<file path=ppt/slides/slide5.xml><?xml version="1.0" encoding="utf-8"?>
 <p:sld xmlns:a="http://schemas.openxmlformats.org/drawingml/2006/main" xmlns:r="http://schemas.openxmlformats.org/officeDocument/2006/relationships" xmlns:p="http://schemas.openxmlformats.org/presentationml/2006/main">
   <p:cSld>
     <p:spTree>

</xml_diff>